<commit_message>
slides: some minor changes
</commit_message>
<xml_diff>
--- a/slides/flink_batch_basics.pptx
+++ b/slides/flink_batch_basics.pptx
@@ -28,8 +28,8 @@
     <p:sldId id="301" r:id="rId19"/>
     <p:sldId id="302" r:id="rId20"/>
     <p:sldId id="266" r:id="rId21"/>
-    <p:sldId id="278" r:id="rId22"/>
-    <p:sldId id="279" r:id="rId23"/>
+    <p:sldId id="306" r:id="rId22"/>
+    <p:sldId id="307" r:id="rId23"/>
     <p:sldId id="275" r:id="rId24"/>
     <p:sldId id="276" r:id="rId25"/>
     <p:sldId id="277" r:id="rId26"/>
@@ -244,7 +244,7 @@
           <a:p>
             <a:fld id="{F01141F9-3E73-7448-86C2-E96D93FE379F}" type="datetimeFigureOut">
               <a:rPr lang="en-US" smtClean="0"/>
-              <a:t>02/06/15</a:t>
+              <a:t>03/06/15</a:t>
             </a:fld>
             <a:endParaRPr lang="en-US"/>
           </a:p>
@@ -13232,7 +13232,7 @@
     </p:spTree>
     <p:extLst>
       <p:ext uri="{BB962C8B-B14F-4D97-AF65-F5344CB8AC3E}">
-        <p14:creationId xmlns:p14="http://schemas.microsoft.com/office/powerpoint/2010/main" val="252324617"/>
+        <p14:creationId xmlns:p14="http://schemas.microsoft.com/office/powerpoint/2010/main" val="351229402"/>
       </p:ext>
     </p:extLst>
   </p:cSld>
@@ -14025,7 +14025,7 @@
     </p:spTree>
     <p:extLst>
       <p:ext uri="{BB962C8B-B14F-4D97-AF65-F5344CB8AC3E}">
-        <p14:creationId xmlns:p14="http://schemas.microsoft.com/office/powerpoint/2010/main" val="1815067510"/>
+        <p14:creationId xmlns:p14="http://schemas.microsoft.com/office/powerpoint/2010/main" val="98518248"/>
       </p:ext>
     </p:extLst>
   </p:cSld>
@@ -23654,17 +23654,7 @@
                 <a:latin typeface="Avenir Book"/>
                 <a:cs typeface="Avenir Book"/>
               </a:rPr>
-              <a:t>Lazily </a:t>
-            </a:r>
-            <a:r>
-              <a:rPr lang="en-US" sz="2600" dirty="0" smtClean="0">
-                <a:solidFill>
-                  <a:srgbClr val="000000"/>
-                </a:solidFill>
-                <a:latin typeface="Avenir Book"/>
-                <a:cs typeface="Avenir Book"/>
-              </a:rPr>
-              <a:t>executed when </a:t>
+              <a:t>Lazily executed when </a:t>
             </a:r>
             <a:r>
               <a:rPr lang="en-US" sz="2600" dirty="0" err="1" smtClean="0">
@@ -24533,16 +24523,7 @@
                 </a:solidFill>
                 <a:latin typeface="Menlo"/>
               </a:rPr>
-              <a:t>)</a:t>
-            </a:r>
-            <a:r>
-              <a:rPr lang="en-US" sz="1600" dirty="0" smtClean="0">
-                <a:solidFill>
-                  <a:srgbClr val="000000"/>
-                </a:solidFill>
-                <a:latin typeface="Menlo"/>
-              </a:rPr>
-              <a:t>;</a:t>
+              <a:t>);</a:t>
             </a:r>
           </a:p>
         </p:txBody>
@@ -24681,17 +24662,7 @@
                 <a:latin typeface="Avenir Book"/>
                 <a:cs typeface="Avenir Book"/>
               </a:rPr>
-              <a:t>Eagerly </a:t>
-            </a:r>
-            <a:r>
-              <a:rPr lang="en-US" sz="2400" dirty="0" smtClean="0">
-                <a:solidFill>
-                  <a:srgbClr val="000000"/>
-                </a:solidFill>
-                <a:latin typeface="Avenir Book"/>
-                <a:cs typeface="Avenir Book"/>
-              </a:rPr>
-              <a:t>executed</a:t>
+              <a:t>Eagerly executed</a:t>
             </a:r>
           </a:p>
           <a:p>
@@ -25358,11 +25329,7 @@
             </a:r>
             <a:r>
               <a:rPr lang="en-US" dirty="0" smtClean="0"/>
-              <a:t> to quickly </a:t>
-            </a:r>
-            <a:r>
-              <a:rPr lang="en-US" dirty="0" smtClean="0"/>
-              <a:t>print a </a:t>
+              <a:t> to quickly print a </a:t>
             </a:r>
             <a:r>
               <a:rPr lang="en-US" dirty="0" err="1" smtClean="0"/>
@@ -25429,19 +25396,8 @@
                 <a:latin typeface="Avenir Book"/>
                 <a:cs typeface="Avenir Book"/>
               </a:rPr>
-              <a:t>on an Operator to </a:t>
-            </a:r>
-            <a:r>
-              <a:rPr lang="en-US" dirty="0" smtClean="0">
-                <a:latin typeface="Avenir Book"/>
-                <a:cs typeface="Avenir Book"/>
-              </a:rPr>
-              <a:t>find it easily in the logs</a:t>
-            </a:r>
-            <a:endParaRPr lang="en-US" dirty="0" smtClean="0">
-              <a:latin typeface="Avenir Book"/>
-              <a:cs typeface="Avenir Book"/>
-            </a:endParaRPr>
+              <a:t>on an Operator to find it easily in the logs</a:t>
+            </a:r>
           </a:p>
           <a:p>
             <a:endParaRPr lang="en-US" dirty="0"/>

</xml_diff>